<commit_message>
Added pdf for requirements and hid slides that are outdated
Additional cleaning needs to be done.
</commit_message>
<xml_diff>
--- a/Documentation/Upload_Program.pptx
+++ b/Documentation/Upload_Program.pptx
@@ -7,11 +7,11 @@
   <p:sldIdLst>
     <p:sldId id="256" r:id="rId2"/>
     <p:sldId id="257" r:id="rId3"/>
-    <p:sldId id="261" r:id="rId4"/>
-    <p:sldId id="258" r:id="rId5"/>
-    <p:sldId id="262" r:id="rId6"/>
-    <p:sldId id="263" r:id="rId7"/>
-    <p:sldId id="259" r:id="rId8"/>
+    <p:sldId id="259" r:id="rId4"/>
+    <p:sldId id="261" r:id="rId5"/>
+    <p:sldId id="258" r:id="rId6"/>
+    <p:sldId id="262" r:id="rId7"/>
+    <p:sldId id="263" r:id="rId8"/>
     <p:sldId id="260" r:id="rId9"/>
   </p:sldIdLst>
   <p:sldSz cx="12192000" cy="6858000"/>
@@ -266,7 +266,7 @@
           <a:p>
             <a:fld id="{87DF8024-457D-4A92-85B1-38568D8112B6}" type="datetimeFigureOut">
               <a:rPr lang="en-US" smtClean="0"/>
-              <a:t>2/9/2022</a:t>
+              <a:t>7/26/2022</a:t>
             </a:fld>
             <a:endParaRPr lang="en-US"/>
           </a:p>
@@ -464,7 +464,7 @@
           <a:p>
             <a:fld id="{87DF8024-457D-4A92-85B1-38568D8112B6}" type="datetimeFigureOut">
               <a:rPr lang="en-US" smtClean="0"/>
-              <a:t>2/9/2022</a:t>
+              <a:t>7/26/2022</a:t>
             </a:fld>
             <a:endParaRPr lang="en-US"/>
           </a:p>
@@ -672,7 +672,7 @@
           <a:p>
             <a:fld id="{87DF8024-457D-4A92-85B1-38568D8112B6}" type="datetimeFigureOut">
               <a:rPr lang="en-US" smtClean="0"/>
-              <a:t>2/9/2022</a:t>
+              <a:t>7/26/2022</a:t>
             </a:fld>
             <a:endParaRPr lang="en-US"/>
           </a:p>
@@ -870,7 +870,7 @@
           <a:p>
             <a:fld id="{87DF8024-457D-4A92-85B1-38568D8112B6}" type="datetimeFigureOut">
               <a:rPr lang="en-US" smtClean="0"/>
-              <a:t>2/9/2022</a:t>
+              <a:t>7/26/2022</a:t>
             </a:fld>
             <a:endParaRPr lang="en-US"/>
           </a:p>
@@ -1145,7 +1145,7 @@
           <a:p>
             <a:fld id="{87DF8024-457D-4A92-85B1-38568D8112B6}" type="datetimeFigureOut">
               <a:rPr lang="en-US" smtClean="0"/>
-              <a:t>2/9/2022</a:t>
+              <a:t>7/26/2022</a:t>
             </a:fld>
             <a:endParaRPr lang="en-US"/>
           </a:p>
@@ -1410,7 +1410,7 @@
           <a:p>
             <a:fld id="{87DF8024-457D-4A92-85B1-38568D8112B6}" type="datetimeFigureOut">
               <a:rPr lang="en-US" smtClean="0"/>
-              <a:t>2/9/2022</a:t>
+              <a:t>7/26/2022</a:t>
             </a:fld>
             <a:endParaRPr lang="en-US"/>
           </a:p>
@@ -1822,7 +1822,7 @@
           <a:p>
             <a:fld id="{87DF8024-457D-4A92-85B1-38568D8112B6}" type="datetimeFigureOut">
               <a:rPr lang="en-US" smtClean="0"/>
-              <a:t>2/9/2022</a:t>
+              <a:t>7/26/2022</a:t>
             </a:fld>
             <a:endParaRPr lang="en-US"/>
           </a:p>
@@ -1963,7 +1963,7 @@
           <a:p>
             <a:fld id="{87DF8024-457D-4A92-85B1-38568D8112B6}" type="datetimeFigureOut">
               <a:rPr lang="en-US" smtClean="0"/>
-              <a:t>2/9/2022</a:t>
+              <a:t>7/26/2022</a:t>
             </a:fld>
             <a:endParaRPr lang="en-US"/>
           </a:p>
@@ -2076,7 +2076,7 @@
           <a:p>
             <a:fld id="{87DF8024-457D-4A92-85B1-38568D8112B6}" type="datetimeFigureOut">
               <a:rPr lang="en-US" smtClean="0"/>
-              <a:t>2/9/2022</a:t>
+              <a:t>7/26/2022</a:t>
             </a:fld>
             <a:endParaRPr lang="en-US"/>
           </a:p>
@@ -2387,7 +2387,7 @@
           <a:p>
             <a:fld id="{87DF8024-457D-4A92-85B1-38568D8112B6}" type="datetimeFigureOut">
               <a:rPr lang="en-US" smtClean="0"/>
-              <a:t>2/9/2022</a:t>
+              <a:t>7/26/2022</a:t>
             </a:fld>
             <a:endParaRPr lang="en-US"/>
           </a:p>
@@ -2675,7 +2675,7 @@
           <a:p>
             <a:fld id="{87DF8024-457D-4A92-85B1-38568D8112B6}" type="datetimeFigureOut">
               <a:rPr lang="en-US" smtClean="0"/>
-              <a:t>2/9/2022</a:t>
+              <a:t>7/26/2022</a:t>
             </a:fld>
             <a:endParaRPr lang="en-US"/>
           </a:p>
@@ -2916,7 +2916,7 @@
           <a:p>
             <a:fld id="{87DF8024-457D-4A92-85B1-38568D8112B6}" type="datetimeFigureOut">
               <a:rPr lang="en-US" smtClean="0"/>
-              <a:t>2/9/2022</a:t>
+              <a:t>7/26/2022</a:t>
             </a:fld>
             <a:endParaRPr lang="en-US"/>
           </a:p>
@@ -3564,707 +3564,6 @@
           <a:p>
             <a:r>
               <a:rPr lang="en-US" dirty="0"/>
-              <a:t>Preparing Visual Studio Code Environment</a:t>
-            </a:r>
-          </a:p>
-        </p:txBody>
-      </p:sp>
-      <p:sp>
-        <p:nvSpPr>
-          <p:cNvPr id="3" name="Content Placeholder 2">
-            <a:extLst>
-              <a:ext uri="{FF2B5EF4-FFF2-40B4-BE49-F238E27FC236}">
-                <a16:creationId xmlns:a16="http://schemas.microsoft.com/office/drawing/2014/main" id="{A4C73B0B-0123-4494-BF0B-F50920C3F80C}"/>
-              </a:ext>
-            </a:extLst>
-          </p:cNvPr>
-          <p:cNvSpPr>
-            <a:spLocks noGrp="1"/>
-          </p:cNvSpPr>
-          <p:nvPr>
-            <p:ph idx="1"/>
-          </p:nvPr>
-        </p:nvSpPr>
-        <p:spPr>
-          <a:xfrm>
-            <a:off x="838200" y="1825625"/>
-            <a:ext cx="10515600" cy="4830814"/>
-          </a:xfrm>
-        </p:spPr>
-        <p:txBody>
-          <a:bodyPr>
-            <a:normAutofit/>
-          </a:bodyPr>
-          <a:lstStyle/>
-          <a:p>
-            <a:r>
-              <a:rPr lang="en-US" dirty="0"/>
-              <a:t>Download the latest Visual Studio Code software from </a:t>
-            </a:r>
-            <a:r>
-              <a:rPr lang="en-US" dirty="0">
-                <a:hlinkClick r:id="rId2"/>
-              </a:rPr>
-              <a:t>https://code.visualstudio.com/Download</a:t>
-            </a:r>
-            <a:endParaRPr lang="en-US" dirty="0"/>
-          </a:p>
-          <a:p>
-            <a:r>
-              <a:rPr lang="en-US" dirty="0"/>
-              <a:t>You can add any C++ extensions you’d like; this software doesn’t depend on anything specific.</a:t>
-            </a:r>
-          </a:p>
-          <a:p>
-            <a:r>
-              <a:rPr lang="en-US" dirty="0" err="1"/>
-              <a:t>PlatformIO</a:t>
-            </a:r>
-            <a:r>
-              <a:rPr lang="en-US" dirty="0"/>
-              <a:t>, which is a way to directly upload code (other than using the Arduino) does not seem to work well with </a:t>
-            </a:r>
-            <a:r>
-              <a:rPr lang="en-US" dirty="0" err="1"/>
-              <a:t>Lulzbot</a:t>
-            </a:r>
-            <a:r>
-              <a:rPr lang="en-US" dirty="0"/>
-              <a:t> firmware.</a:t>
-            </a:r>
-          </a:p>
-        </p:txBody>
-      </p:sp>
-    </p:spTree>
-    <p:extLst>
-      <p:ext uri="{BB962C8B-B14F-4D97-AF65-F5344CB8AC3E}">
-        <p14:creationId xmlns:p14="http://schemas.microsoft.com/office/powerpoint/2010/main" val="395042153"/>
-      </p:ext>
-    </p:extLst>
-  </p:cSld>
-  <p:clrMapOvr>
-    <a:masterClrMapping/>
-  </p:clrMapOvr>
-</p:sld>
-</file>
-
-<file path=ppt/slides/slide4.xml><?xml version="1.0" encoding="utf-8"?>
-<p:sld xmlns:a="http://schemas.openxmlformats.org/drawingml/2006/main" xmlns:r="http://schemas.openxmlformats.org/officeDocument/2006/relationships" xmlns:p="http://schemas.openxmlformats.org/presentationml/2006/main">
-  <p:cSld>
-    <p:spTree>
-      <p:nvGrpSpPr>
-        <p:cNvPr id="1" name=""/>
-        <p:cNvGrpSpPr/>
-        <p:nvPr/>
-      </p:nvGrpSpPr>
-      <p:grpSpPr>
-        <a:xfrm>
-          <a:off x="0" y="0"/>
-          <a:ext cx="0" cy="0"/>
-          <a:chOff x="0" y="0"/>
-          <a:chExt cx="0" cy="0"/>
-        </a:xfrm>
-      </p:grpSpPr>
-      <p:sp>
-        <p:nvSpPr>
-          <p:cNvPr id="2" name="Title 1">
-            <a:extLst>
-              <a:ext uri="{FF2B5EF4-FFF2-40B4-BE49-F238E27FC236}">
-                <a16:creationId xmlns:a16="http://schemas.microsoft.com/office/drawing/2014/main" id="{F9EF1949-871A-49E8-9C3B-0DB2DAB65832}"/>
-              </a:ext>
-            </a:extLst>
-          </p:cNvPr>
-          <p:cNvSpPr>
-            <a:spLocks noGrp="1"/>
-          </p:cNvSpPr>
-          <p:nvPr>
-            <p:ph type="title"/>
-          </p:nvPr>
-        </p:nvSpPr>
-        <p:spPr/>
-        <p:txBody>
-          <a:bodyPr/>
-          <a:lstStyle/>
-          <a:p>
-            <a:r>
-              <a:rPr lang="en-US" dirty="0"/>
-              <a:t>Preparing Arduino Environment</a:t>
-            </a:r>
-          </a:p>
-        </p:txBody>
-      </p:sp>
-      <p:sp>
-        <p:nvSpPr>
-          <p:cNvPr id="3" name="Content Placeholder 2">
-            <a:extLst>
-              <a:ext uri="{FF2B5EF4-FFF2-40B4-BE49-F238E27FC236}">
-                <a16:creationId xmlns:a16="http://schemas.microsoft.com/office/drawing/2014/main" id="{A4C73B0B-0123-4494-BF0B-F50920C3F80C}"/>
-              </a:ext>
-            </a:extLst>
-          </p:cNvPr>
-          <p:cNvSpPr>
-            <a:spLocks noGrp="1"/>
-          </p:cNvSpPr>
-          <p:nvPr>
-            <p:ph idx="1"/>
-          </p:nvPr>
-        </p:nvSpPr>
-        <p:spPr>
-          <a:xfrm>
-            <a:off x="838200" y="1825625"/>
-            <a:ext cx="10515600" cy="4830814"/>
-          </a:xfrm>
-        </p:spPr>
-        <p:txBody>
-          <a:bodyPr>
-            <a:normAutofit fontScale="92500" lnSpcReduction="10000"/>
-          </a:bodyPr>
-          <a:lstStyle/>
-          <a:p>
-            <a:r>
-              <a:rPr lang="en-US" dirty="0"/>
-              <a:t>Download the latest Arduino software from </a:t>
-            </a:r>
-            <a:r>
-              <a:rPr lang="en-US" dirty="0">
-                <a:hlinkClick r:id="rId2"/>
-              </a:rPr>
-              <a:t>https://www.arduino.cc/en/software</a:t>
-            </a:r>
-            <a:endParaRPr lang="en-US" dirty="0"/>
-          </a:p>
-          <a:p>
-            <a:r>
-              <a:rPr lang="en-US" dirty="0"/>
-              <a:t>Install the </a:t>
-            </a:r>
-            <a:r>
-              <a:rPr lang="en-US" dirty="0" err="1"/>
-              <a:t>Archim</a:t>
-            </a:r>
-            <a:r>
-              <a:rPr lang="en-US" dirty="0"/>
-              <a:t> board for the Arduino software. Instructions (reproduced below) are on </a:t>
-            </a:r>
-            <a:r>
-              <a:rPr lang="en-US" dirty="0">
-                <a:hlinkClick r:id="rId3"/>
-              </a:rPr>
-              <a:t>https://reprap.org/wiki/Archim2</a:t>
-            </a:r>
-            <a:endParaRPr lang="en-US" dirty="0"/>
-          </a:p>
-          <a:p>
-            <a:pPr marL="914400" lvl="1" indent="-457200">
-              <a:buFont typeface="+mj-lt"/>
-              <a:buAutoNum type="arabicPeriod"/>
-            </a:pPr>
-            <a:r>
-              <a:rPr lang="en-US" sz="2600" b="0" i="0" dirty="0">
-                <a:solidFill>
-                  <a:srgbClr val="222222"/>
-                </a:solidFill>
-                <a:effectLst/>
-                <a:latin typeface="Arial" panose="020B0604020202020204" pitchFamily="34" charset="0"/>
-              </a:rPr>
-              <a:t>Install </a:t>
-            </a:r>
-            <a:r>
-              <a:rPr lang="en-US" sz="2600" b="0" i="0" dirty="0" err="1">
-                <a:solidFill>
-                  <a:srgbClr val="222222"/>
-                </a:solidFill>
-                <a:effectLst/>
-                <a:latin typeface="Arial" panose="020B0604020202020204" pitchFamily="34" charset="0"/>
-              </a:rPr>
-              <a:t>Archim</a:t>
-            </a:r>
-            <a:r>
-              <a:rPr lang="en-US" sz="2600" b="0" i="0" dirty="0">
-                <a:solidFill>
-                  <a:srgbClr val="222222"/>
-                </a:solidFill>
-                <a:effectLst/>
-                <a:latin typeface="Arial" panose="020B0604020202020204" pitchFamily="34" charset="0"/>
-              </a:rPr>
-              <a:t> board support:</a:t>
-            </a:r>
-          </a:p>
-          <a:p>
-            <a:pPr lvl="2"/>
-            <a:r>
-              <a:rPr lang="en-US" b="0" i="0" dirty="0">
-                <a:solidFill>
-                  <a:srgbClr val="222222"/>
-                </a:solidFill>
-                <a:effectLst/>
-                <a:latin typeface="Arial" panose="020B0604020202020204" pitchFamily="34" charset="0"/>
-              </a:rPr>
-              <a:t>From the Arduino File menu select Preferences.</a:t>
-            </a:r>
-          </a:p>
-          <a:p>
-            <a:pPr lvl="2"/>
-            <a:r>
-              <a:rPr lang="en-US" b="0" i="0" dirty="0">
-                <a:solidFill>
-                  <a:srgbClr val="222222"/>
-                </a:solidFill>
-                <a:effectLst/>
-                <a:latin typeface="Arial" panose="020B0604020202020204" pitchFamily="34" charset="0"/>
-              </a:rPr>
-              <a:t>Add the following URL to "Additional Board Manager URLs" section.</a:t>
-            </a:r>
-          </a:p>
-          <a:p>
-            <a:pPr lvl="2"/>
-            <a:r>
-              <a:rPr lang="en-US" b="0" i="0" dirty="0">
-                <a:solidFill>
-                  <a:srgbClr val="222222"/>
-                </a:solidFill>
-                <a:effectLst/>
-                <a:latin typeface="Arial" panose="020B0604020202020204" pitchFamily="34" charset="0"/>
-                <a:hlinkClick r:id="rId4"/>
-              </a:rPr>
-              <a:t>https://raw.githubusercontent.com/ultimachine/ArduinoAddons/master/package_ultimachine_index.json</a:t>
-            </a:r>
-            <a:endParaRPr lang="en-US" b="0" i="0" dirty="0">
-              <a:solidFill>
-                <a:srgbClr val="222222"/>
-              </a:solidFill>
-              <a:effectLst/>
-              <a:latin typeface="Arial" panose="020B0604020202020204" pitchFamily="34" charset="0"/>
-            </a:endParaRPr>
-          </a:p>
-          <a:p>
-            <a:pPr lvl="2"/>
-            <a:r>
-              <a:rPr lang="en-US" b="0" i="0" dirty="0">
-                <a:solidFill>
-                  <a:srgbClr val="222222"/>
-                </a:solidFill>
-                <a:effectLst/>
-                <a:latin typeface="Arial" panose="020B0604020202020204" pitchFamily="34" charset="0"/>
-              </a:rPr>
-              <a:t>The Board Manager is found at the top of the Tools-&gt;Board selection menu.</a:t>
-            </a:r>
-          </a:p>
-          <a:p>
-            <a:pPr lvl="2"/>
-            <a:r>
-              <a:rPr lang="en-US" b="0" i="0" dirty="0">
-                <a:solidFill>
-                  <a:srgbClr val="222222"/>
-                </a:solidFill>
-                <a:effectLst/>
-                <a:latin typeface="Arial" panose="020B0604020202020204" pitchFamily="34" charset="0"/>
-              </a:rPr>
-              <a:t>Open the Board Manager and the list boards will automatically update.</a:t>
-            </a:r>
-          </a:p>
-          <a:p>
-            <a:pPr lvl="2"/>
-            <a:r>
-              <a:rPr lang="en-US" b="0" i="0" dirty="0">
-                <a:solidFill>
-                  <a:srgbClr val="222222"/>
-                </a:solidFill>
-                <a:effectLst/>
-                <a:latin typeface="Arial" panose="020B0604020202020204" pitchFamily="34" charset="0"/>
-              </a:rPr>
-              <a:t>Search for </a:t>
-            </a:r>
-            <a:r>
-              <a:rPr lang="en-US" b="0" i="0" dirty="0" err="1">
-                <a:solidFill>
-                  <a:srgbClr val="222222"/>
-                </a:solidFill>
-                <a:effectLst/>
-                <a:latin typeface="Arial" panose="020B0604020202020204" pitchFamily="34" charset="0"/>
-              </a:rPr>
-              <a:t>Archim</a:t>
-            </a:r>
-            <a:r>
-              <a:rPr lang="en-US" b="0" i="0" dirty="0">
-                <a:solidFill>
-                  <a:srgbClr val="222222"/>
-                </a:solidFill>
-                <a:effectLst/>
-                <a:latin typeface="Arial" panose="020B0604020202020204" pitchFamily="34" charset="0"/>
-              </a:rPr>
-              <a:t> and install.</a:t>
-            </a:r>
-          </a:p>
-          <a:p>
-            <a:pPr marL="914400" lvl="1" indent="-457200">
-              <a:buFont typeface="+mj-lt"/>
-              <a:buAutoNum type="arabicPeriod"/>
-            </a:pPr>
-            <a:r>
-              <a:rPr lang="en-US" sz="2600" b="0" i="0" dirty="0">
-                <a:solidFill>
-                  <a:srgbClr val="222222"/>
-                </a:solidFill>
-                <a:effectLst/>
-                <a:latin typeface="Arial" panose="020B0604020202020204" pitchFamily="34" charset="0"/>
-              </a:rPr>
-              <a:t>Install </a:t>
-            </a:r>
-            <a:r>
-              <a:rPr lang="en-US" sz="2600" b="0" i="0" dirty="0" err="1">
-                <a:solidFill>
-                  <a:srgbClr val="222222"/>
-                </a:solidFill>
-                <a:effectLst/>
-                <a:latin typeface="Arial" panose="020B0604020202020204" pitchFamily="34" charset="0"/>
-              </a:rPr>
-              <a:t>TMCStepper</a:t>
-            </a:r>
-            <a:r>
-              <a:rPr lang="en-US" sz="2600" b="0" i="0" dirty="0">
-                <a:solidFill>
-                  <a:srgbClr val="222222"/>
-                </a:solidFill>
-                <a:effectLst/>
-                <a:latin typeface="Arial" panose="020B0604020202020204" pitchFamily="34" charset="0"/>
-              </a:rPr>
-              <a:t> library: Arduino IDE-&gt; Sketch menu -&gt; Include Library -&gt; Manage Libraries -&gt; install </a:t>
-            </a:r>
-            <a:r>
-              <a:rPr lang="en-US" sz="2600" b="0" i="0" dirty="0" err="1">
-                <a:solidFill>
-                  <a:srgbClr val="222222"/>
-                </a:solidFill>
-                <a:effectLst/>
-                <a:latin typeface="Arial" panose="020B0604020202020204" pitchFamily="34" charset="0"/>
-              </a:rPr>
-              <a:t>TMCStepper</a:t>
-            </a:r>
-            <a:endParaRPr lang="en-US" sz="2600" b="0" i="0" dirty="0">
-              <a:solidFill>
-                <a:srgbClr val="222222"/>
-              </a:solidFill>
-              <a:effectLst/>
-              <a:latin typeface="Arial" panose="020B0604020202020204" pitchFamily="34" charset="0"/>
-            </a:endParaRPr>
-          </a:p>
-          <a:p>
-            <a:pPr lvl="1"/>
-            <a:endParaRPr lang="en-US" dirty="0"/>
-          </a:p>
-        </p:txBody>
-      </p:sp>
-    </p:spTree>
-    <p:extLst>
-      <p:ext uri="{BB962C8B-B14F-4D97-AF65-F5344CB8AC3E}">
-        <p14:creationId xmlns:p14="http://schemas.microsoft.com/office/powerpoint/2010/main" val="3803564054"/>
-      </p:ext>
-    </p:extLst>
-  </p:cSld>
-  <p:clrMapOvr>
-    <a:masterClrMapping/>
-  </p:clrMapOvr>
-</p:sld>
-</file>
-
-<file path=ppt/slides/slide5.xml><?xml version="1.0" encoding="utf-8"?>
-<p:sld xmlns:a="http://schemas.openxmlformats.org/drawingml/2006/main" xmlns:r="http://schemas.openxmlformats.org/officeDocument/2006/relationships" xmlns:p="http://schemas.openxmlformats.org/presentationml/2006/main">
-  <p:cSld>
-    <p:spTree>
-      <p:nvGrpSpPr>
-        <p:cNvPr id="1" name=""/>
-        <p:cNvGrpSpPr/>
-        <p:nvPr/>
-      </p:nvGrpSpPr>
-      <p:grpSpPr>
-        <a:xfrm>
-          <a:off x="0" y="0"/>
-          <a:ext cx="0" cy="0"/>
-          <a:chOff x="0" y="0"/>
-          <a:chExt cx="0" cy="0"/>
-        </a:xfrm>
-      </p:grpSpPr>
-      <p:sp>
-        <p:nvSpPr>
-          <p:cNvPr id="2" name="Title 1">
-            <a:extLst>
-              <a:ext uri="{FF2B5EF4-FFF2-40B4-BE49-F238E27FC236}">
-                <a16:creationId xmlns:a16="http://schemas.microsoft.com/office/drawing/2014/main" id="{F9EF1949-871A-49E8-9C3B-0DB2DAB65832}"/>
-              </a:ext>
-            </a:extLst>
-          </p:cNvPr>
-          <p:cNvSpPr>
-            <a:spLocks noGrp="1"/>
-          </p:cNvSpPr>
-          <p:nvPr>
-            <p:ph type="title"/>
-          </p:nvPr>
-        </p:nvSpPr>
-        <p:spPr/>
-        <p:txBody>
-          <a:bodyPr/>
-          <a:lstStyle/>
-          <a:p>
-            <a:r>
-              <a:rPr lang="en-US" dirty="0"/>
-              <a:t>Modifying the code</a:t>
-            </a:r>
-            <a:br>
-              <a:rPr lang="en-US" dirty="0"/>
-            </a:br>
-            <a:r>
-              <a:rPr lang="en-US" dirty="0"/>
-              <a:t>Open Arduino IDE</a:t>
-            </a:r>
-          </a:p>
-        </p:txBody>
-      </p:sp>
-      <p:sp>
-        <p:nvSpPr>
-          <p:cNvPr id="3" name="Content Placeholder 2">
-            <a:extLst>
-              <a:ext uri="{FF2B5EF4-FFF2-40B4-BE49-F238E27FC236}">
-                <a16:creationId xmlns:a16="http://schemas.microsoft.com/office/drawing/2014/main" id="{A4C73B0B-0123-4494-BF0B-F50920C3F80C}"/>
-              </a:ext>
-            </a:extLst>
-          </p:cNvPr>
-          <p:cNvSpPr>
-            <a:spLocks noGrp="1"/>
-          </p:cNvSpPr>
-          <p:nvPr>
-            <p:ph idx="1"/>
-          </p:nvPr>
-        </p:nvSpPr>
-        <p:spPr>
-          <a:xfrm>
-            <a:off x="838200" y="1825625"/>
-            <a:ext cx="10515600" cy="4830814"/>
-          </a:xfrm>
-        </p:spPr>
-        <p:txBody>
-          <a:bodyPr>
-            <a:normAutofit/>
-          </a:bodyPr>
-          <a:lstStyle/>
-          <a:p>
-            <a:r>
-              <a:rPr lang="en-US" dirty="0"/>
-              <a:t>To prepare the code for modification, Open the “</a:t>
-            </a:r>
-            <a:r>
-              <a:rPr lang="en-US" dirty="0" err="1"/>
-              <a:t>Marlin.ino</a:t>
-            </a:r>
-            <a:r>
-              <a:rPr lang="en-US" dirty="0"/>
-              <a:t>” file in the Arduino IDE</a:t>
-            </a:r>
-          </a:p>
-          <a:p>
-            <a:r>
-              <a:rPr lang="en-US" dirty="0"/>
-              <a:t>Then select File-&gt;Preferences</a:t>
-            </a:r>
-          </a:p>
-          <a:p>
-            <a:r>
-              <a:rPr lang="en-US" dirty="0"/>
-              <a:t>In the options, select “Use External Editor”, and then confirm by selecting “OK”</a:t>
-            </a:r>
-          </a:p>
-          <a:p>
-            <a:r>
-              <a:rPr lang="en-US" dirty="0"/>
-              <a:t>Preparing the environment this way allows us to use the Arduino environment as an uploading environment while also allowing us to modify the same code that’s opened in Visual Studio Code</a:t>
-            </a:r>
-          </a:p>
-        </p:txBody>
-      </p:sp>
-    </p:spTree>
-    <p:extLst>
-      <p:ext uri="{BB962C8B-B14F-4D97-AF65-F5344CB8AC3E}">
-        <p14:creationId xmlns:p14="http://schemas.microsoft.com/office/powerpoint/2010/main" val="2503059429"/>
-      </p:ext>
-    </p:extLst>
-  </p:cSld>
-  <p:clrMapOvr>
-    <a:masterClrMapping/>
-  </p:clrMapOvr>
-</p:sld>
-</file>
-
-<file path=ppt/slides/slide6.xml><?xml version="1.0" encoding="utf-8"?>
-<p:sld xmlns:a="http://schemas.openxmlformats.org/drawingml/2006/main" xmlns:r="http://schemas.openxmlformats.org/officeDocument/2006/relationships" xmlns:p="http://schemas.openxmlformats.org/presentationml/2006/main">
-  <p:cSld>
-    <p:spTree>
-      <p:nvGrpSpPr>
-        <p:cNvPr id="1" name=""/>
-        <p:cNvGrpSpPr/>
-        <p:nvPr/>
-      </p:nvGrpSpPr>
-      <p:grpSpPr>
-        <a:xfrm>
-          <a:off x="0" y="0"/>
-          <a:ext cx="0" cy="0"/>
-          <a:chOff x="0" y="0"/>
-          <a:chExt cx="0" cy="0"/>
-        </a:xfrm>
-      </p:grpSpPr>
-      <p:sp>
-        <p:nvSpPr>
-          <p:cNvPr id="2" name="Title 1">
-            <a:extLst>
-              <a:ext uri="{FF2B5EF4-FFF2-40B4-BE49-F238E27FC236}">
-                <a16:creationId xmlns:a16="http://schemas.microsoft.com/office/drawing/2014/main" id="{F9EF1949-871A-49E8-9C3B-0DB2DAB65832}"/>
-              </a:ext>
-            </a:extLst>
-          </p:cNvPr>
-          <p:cNvSpPr>
-            <a:spLocks noGrp="1"/>
-          </p:cNvSpPr>
-          <p:nvPr>
-            <p:ph type="title"/>
-          </p:nvPr>
-        </p:nvSpPr>
-        <p:spPr/>
-        <p:txBody>
-          <a:bodyPr/>
-          <a:lstStyle/>
-          <a:p>
-            <a:r>
-              <a:rPr lang="en-US" dirty="0"/>
-              <a:t>Modifying the code</a:t>
-            </a:r>
-            <a:br>
-              <a:rPr lang="en-US" dirty="0"/>
-            </a:br>
-            <a:r>
-              <a:rPr lang="en-US" dirty="0"/>
-              <a:t>Open Visual Studio Code IDE</a:t>
-            </a:r>
-          </a:p>
-        </p:txBody>
-      </p:sp>
-      <p:sp>
-        <p:nvSpPr>
-          <p:cNvPr id="3" name="Content Placeholder 2">
-            <a:extLst>
-              <a:ext uri="{FF2B5EF4-FFF2-40B4-BE49-F238E27FC236}">
-                <a16:creationId xmlns:a16="http://schemas.microsoft.com/office/drawing/2014/main" id="{A4C73B0B-0123-4494-BF0B-F50920C3F80C}"/>
-              </a:ext>
-            </a:extLst>
-          </p:cNvPr>
-          <p:cNvSpPr>
-            <a:spLocks noGrp="1"/>
-          </p:cNvSpPr>
-          <p:nvPr>
-            <p:ph idx="1"/>
-          </p:nvPr>
-        </p:nvSpPr>
-        <p:spPr>
-          <a:xfrm>
-            <a:off x="838200" y="1825625"/>
-            <a:ext cx="10515600" cy="4830814"/>
-          </a:xfrm>
-        </p:spPr>
-        <p:txBody>
-          <a:bodyPr>
-            <a:normAutofit/>
-          </a:bodyPr>
-          <a:lstStyle/>
-          <a:p>
-            <a:r>
-              <a:rPr lang="en-US" dirty="0"/>
-              <a:t>Open Visual Studio Code IDE</a:t>
-            </a:r>
-          </a:p>
-          <a:p>
-            <a:r>
-              <a:rPr lang="en-US" dirty="0"/>
-              <a:t>Select “File” -&gt; “Open Folder”</a:t>
-            </a:r>
-          </a:p>
-          <a:p>
-            <a:r>
-              <a:rPr lang="en-US" dirty="0"/>
-              <a:t>Select the folder that has the code. If downloading the code from </a:t>
-            </a:r>
-            <a:r>
-              <a:rPr lang="en-US" dirty="0" err="1"/>
-              <a:t>Github</a:t>
-            </a:r>
-            <a:r>
-              <a:rPr lang="en-US" dirty="0"/>
-              <a:t>, this would be “exploratory-soft-printer”. Alternatively, you can open the “Marlin” subfolder underneath the “exploratory-soft-printer” folder.</a:t>
-            </a:r>
-          </a:p>
-          <a:p>
-            <a:r>
-              <a:rPr lang="en-US" dirty="0"/>
-              <a:t>You can now edit </a:t>
-            </a:r>
-            <a:r>
-              <a:rPr lang="en-US"/>
-              <a:t>the code.</a:t>
-            </a:r>
-            <a:endParaRPr lang="en-US" dirty="0"/>
-          </a:p>
-        </p:txBody>
-      </p:sp>
-    </p:spTree>
-    <p:extLst>
-      <p:ext uri="{BB962C8B-B14F-4D97-AF65-F5344CB8AC3E}">
-        <p14:creationId xmlns:p14="http://schemas.microsoft.com/office/powerpoint/2010/main" val="368636655"/>
-      </p:ext>
-    </p:extLst>
-  </p:cSld>
-  <p:clrMapOvr>
-    <a:masterClrMapping/>
-  </p:clrMapOvr>
-</p:sld>
-</file>
-
-<file path=ppt/slides/slide7.xml><?xml version="1.0" encoding="utf-8"?>
-<p:sld xmlns:a="http://schemas.openxmlformats.org/drawingml/2006/main" xmlns:r="http://schemas.openxmlformats.org/officeDocument/2006/relationships" xmlns:p="http://schemas.openxmlformats.org/presentationml/2006/main">
-  <p:cSld>
-    <p:spTree>
-      <p:nvGrpSpPr>
-        <p:cNvPr id="1" name=""/>
-        <p:cNvGrpSpPr/>
-        <p:nvPr/>
-      </p:nvGrpSpPr>
-      <p:grpSpPr>
-        <a:xfrm>
-          <a:off x="0" y="0"/>
-          <a:ext cx="0" cy="0"/>
-          <a:chOff x="0" y="0"/>
-          <a:chExt cx="0" cy="0"/>
-        </a:xfrm>
-      </p:grpSpPr>
-      <p:sp>
-        <p:nvSpPr>
-          <p:cNvPr id="2" name="Title 1">
-            <a:extLst>
-              <a:ext uri="{FF2B5EF4-FFF2-40B4-BE49-F238E27FC236}">
-                <a16:creationId xmlns:a16="http://schemas.microsoft.com/office/drawing/2014/main" id="{F9EF1949-871A-49E8-9C3B-0DB2DAB65832}"/>
-              </a:ext>
-            </a:extLst>
-          </p:cNvPr>
-          <p:cNvSpPr>
-            <a:spLocks noGrp="1"/>
-          </p:cNvSpPr>
-          <p:nvPr>
-            <p:ph type="title"/>
-          </p:nvPr>
-        </p:nvSpPr>
-        <p:spPr/>
-        <p:txBody>
-          <a:bodyPr/>
-          <a:lstStyle/>
-          <a:p>
-            <a:r>
-              <a:rPr lang="en-US" dirty="0"/>
               <a:t>Uploading Code</a:t>
             </a:r>
             <a:br>
@@ -4532,8 +3831,709 @@
 </p:sld>
 </file>
 
+<file path=ppt/slides/slide4.xml><?xml version="1.0" encoding="utf-8"?>
+<p:sld xmlns:a="http://schemas.openxmlformats.org/drawingml/2006/main" xmlns:r="http://schemas.openxmlformats.org/officeDocument/2006/relationships" xmlns:p="http://schemas.openxmlformats.org/presentationml/2006/main" show="0">
+  <p:cSld>
+    <p:spTree>
+      <p:nvGrpSpPr>
+        <p:cNvPr id="1" name=""/>
+        <p:cNvGrpSpPr/>
+        <p:nvPr/>
+      </p:nvGrpSpPr>
+      <p:grpSpPr>
+        <a:xfrm>
+          <a:off x="0" y="0"/>
+          <a:ext cx="0" cy="0"/>
+          <a:chOff x="0" y="0"/>
+          <a:chExt cx="0" cy="0"/>
+        </a:xfrm>
+      </p:grpSpPr>
+      <p:sp>
+        <p:nvSpPr>
+          <p:cNvPr id="2" name="Title 1">
+            <a:extLst>
+              <a:ext uri="{FF2B5EF4-FFF2-40B4-BE49-F238E27FC236}">
+                <a16:creationId xmlns:a16="http://schemas.microsoft.com/office/drawing/2014/main" id="{F9EF1949-871A-49E8-9C3B-0DB2DAB65832}"/>
+              </a:ext>
+            </a:extLst>
+          </p:cNvPr>
+          <p:cNvSpPr>
+            <a:spLocks noGrp="1"/>
+          </p:cNvSpPr>
+          <p:nvPr>
+            <p:ph type="title"/>
+          </p:nvPr>
+        </p:nvSpPr>
+        <p:spPr/>
+        <p:txBody>
+          <a:bodyPr/>
+          <a:lstStyle/>
+          <a:p>
+            <a:r>
+              <a:rPr lang="en-US" dirty="0"/>
+              <a:t>Preparing Visual Studio Code Environment</a:t>
+            </a:r>
+          </a:p>
+        </p:txBody>
+      </p:sp>
+      <p:sp>
+        <p:nvSpPr>
+          <p:cNvPr id="3" name="Content Placeholder 2">
+            <a:extLst>
+              <a:ext uri="{FF2B5EF4-FFF2-40B4-BE49-F238E27FC236}">
+                <a16:creationId xmlns:a16="http://schemas.microsoft.com/office/drawing/2014/main" id="{A4C73B0B-0123-4494-BF0B-F50920C3F80C}"/>
+              </a:ext>
+            </a:extLst>
+          </p:cNvPr>
+          <p:cNvSpPr>
+            <a:spLocks noGrp="1"/>
+          </p:cNvSpPr>
+          <p:nvPr>
+            <p:ph idx="1"/>
+          </p:nvPr>
+        </p:nvSpPr>
+        <p:spPr>
+          <a:xfrm>
+            <a:off x="838200" y="1825625"/>
+            <a:ext cx="10515600" cy="4830814"/>
+          </a:xfrm>
+        </p:spPr>
+        <p:txBody>
+          <a:bodyPr>
+            <a:normAutofit/>
+          </a:bodyPr>
+          <a:lstStyle/>
+          <a:p>
+            <a:r>
+              <a:rPr lang="en-US" dirty="0"/>
+              <a:t>Download the latest Visual Studio Code software from </a:t>
+            </a:r>
+            <a:r>
+              <a:rPr lang="en-US" dirty="0">
+                <a:hlinkClick r:id="rId2"/>
+              </a:rPr>
+              <a:t>https://code.visualstudio.com/Download</a:t>
+            </a:r>
+            <a:endParaRPr lang="en-US" dirty="0"/>
+          </a:p>
+          <a:p>
+            <a:r>
+              <a:rPr lang="en-US" dirty="0"/>
+              <a:t>You can add any C++ extensions you’d like; this software doesn’t depend on anything specific.</a:t>
+            </a:r>
+          </a:p>
+          <a:p>
+            <a:r>
+              <a:rPr lang="en-US" dirty="0" err="1"/>
+              <a:t>PlatformIO</a:t>
+            </a:r>
+            <a:r>
+              <a:rPr lang="en-US" dirty="0"/>
+              <a:t>, which is a way to directly upload code (other than using the Arduino) does not seem to work well with </a:t>
+            </a:r>
+            <a:r>
+              <a:rPr lang="en-US" dirty="0" err="1"/>
+              <a:t>Lulzbot</a:t>
+            </a:r>
+            <a:r>
+              <a:rPr lang="en-US" dirty="0"/>
+              <a:t> firmware.</a:t>
+            </a:r>
+          </a:p>
+        </p:txBody>
+      </p:sp>
+    </p:spTree>
+    <p:extLst>
+      <p:ext uri="{BB962C8B-B14F-4D97-AF65-F5344CB8AC3E}">
+        <p14:creationId xmlns:p14="http://schemas.microsoft.com/office/powerpoint/2010/main" val="395042153"/>
+      </p:ext>
+    </p:extLst>
+  </p:cSld>
+  <p:clrMapOvr>
+    <a:masterClrMapping/>
+  </p:clrMapOvr>
+</p:sld>
+</file>
+
+<file path=ppt/slides/slide5.xml><?xml version="1.0" encoding="utf-8"?>
+<p:sld xmlns:a="http://schemas.openxmlformats.org/drawingml/2006/main" xmlns:r="http://schemas.openxmlformats.org/officeDocument/2006/relationships" xmlns:p="http://schemas.openxmlformats.org/presentationml/2006/main" show="0">
+  <p:cSld>
+    <p:spTree>
+      <p:nvGrpSpPr>
+        <p:cNvPr id="1" name=""/>
+        <p:cNvGrpSpPr/>
+        <p:nvPr/>
+      </p:nvGrpSpPr>
+      <p:grpSpPr>
+        <a:xfrm>
+          <a:off x="0" y="0"/>
+          <a:ext cx="0" cy="0"/>
+          <a:chOff x="0" y="0"/>
+          <a:chExt cx="0" cy="0"/>
+        </a:xfrm>
+      </p:grpSpPr>
+      <p:sp>
+        <p:nvSpPr>
+          <p:cNvPr id="2" name="Title 1">
+            <a:extLst>
+              <a:ext uri="{FF2B5EF4-FFF2-40B4-BE49-F238E27FC236}">
+                <a16:creationId xmlns:a16="http://schemas.microsoft.com/office/drawing/2014/main" id="{F9EF1949-871A-49E8-9C3B-0DB2DAB65832}"/>
+              </a:ext>
+            </a:extLst>
+          </p:cNvPr>
+          <p:cNvSpPr>
+            <a:spLocks noGrp="1"/>
+          </p:cNvSpPr>
+          <p:nvPr>
+            <p:ph type="title"/>
+          </p:nvPr>
+        </p:nvSpPr>
+        <p:spPr/>
+        <p:txBody>
+          <a:bodyPr/>
+          <a:lstStyle/>
+          <a:p>
+            <a:r>
+              <a:rPr lang="en-US" dirty="0"/>
+              <a:t>Preparing Arduino Environment</a:t>
+            </a:r>
+          </a:p>
+        </p:txBody>
+      </p:sp>
+      <p:sp>
+        <p:nvSpPr>
+          <p:cNvPr id="3" name="Content Placeholder 2">
+            <a:extLst>
+              <a:ext uri="{FF2B5EF4-FFF2-40B4-BE49-F238E27FC236}">
+                <a16:creationId xmlns:a16="http://schemas.microsoft.com/office/drawing/2014/main" id="{A4C73B0B-0123-4494-BF0B-F50920C3F80C}"/>
+              </a:ext>
+            </a:extLst>
+          </p:cNvPr>
+          <p:cNvSpPr>
+            <a:spLocks noGrp="1"/>
+          </p:cNvSpPr>
+          <p:nvPr>
+            <p:ph idx="1"/>
+          </p:nvPr>
+        </p:nvSpPr>
+        <p:spPr>
+          <a:xfrm>
+            <a:off x="838200" y="1825625"/>
+            <a:ext cx="10515600" cy="4830814"/>
+          </a:xfrm>
+        </p:spPr>
+        <p:txBody>
+          <a:bodyPr>
+            <a:normAutofit fontScale="92500" lnSpcReduction="10000"/>
+          </a:bodyPr>
+          <a:lstStyle/>
+          <a:p>
+            <a:r>
+              <a:rPr lang="en-US" dirty="0"/>
+              <a:t>Download the latest Arduino software from </a:t>
+            </a:r>
+            <a:r>
+              <a:rPr lang="en-US" dirty="0">
+                <a:hlinkClick r:id="rId2"/>
+              </a:rPr>
+              <a:t>https://www.arduino.cc/en/software</a:t>
+            </a:r>
+            <a:endParaRPr lang="en-US" dirty="0"/>
+          </a:p>
+          <a:p>
+            <a:r>
+              <a:rPr lang="en-US" dirty="0"/>
+              <a:t>Install the </a:t>
+            </a:r>
+            <a:r>
+              <a:rPr lang="en-US" dirty="0" err="1"/>
+              <a:t>Archim</a:t>
+            </a:r>
+            <a:r>
+              <a:rPr lang="en-US" dirty="0"/>
+              <a:t> board for the Arduino software. Instructions (reproduced below) are on </a:t>
+            </a:r>
+            <a:r>
+              <a:rPr lang="en-US" dirty="0">
+                <a:hlinkClick r:id="rId3"/>
+              </a:rPr>
+              <a:t>https://reprap.org/wiki/Archim2</a:t>
+            </a:r>
+            <a:endParaRPr lang="en-US" dirty="0"/>
+          </a:p>
+          <a:p>
+            <a:pPr marL="914400" lvl="1" indent="-457200">
+              <a:buFont typeface="+mj-lt"/>
+              <a:buAutoNum type="arabicPeriod"/>
+            </a:pPr>
+            <a:r>
+              <a:rPr lang="en-US" sz="2600" b="0" i="0" dirty="0">
+                <a:solidFill>
+                  <a:srgbClr val="222222"/>
+                </a:solidFill>
+                <a:effectLst/>
+                <a:latin typeface="Arial" panose="020B0604020202020204" pitchFamily="34" charset="0"/>
+              </a:rPr>
+              <a:t>Install </a:t>
+            </a:r>
+            <a:r>
+              <a:rPr lang="en-US" sz="2600" b="0" i="0" dirty="0" err="1">
+                <a:solidFill>
+                  <a:srgbClr val="222222"/>
+                </a:solidFill>
+                <a:effectLst/>
+                <a:latin typeface="Arial" panose="020B0604020202020204" pitchFamily="34" charset="0"/>
+              </a:rPr>
+              <a:t>Archim</a:t>
+            </a:r>
+            <a:r>
+              <a:rPr lang="en-US" sz="2600" b="0" i="0" dirty="0">
+                <a:solidFill>
+                  <a:srgbClr val="222222"/>
+                </a:solidFill>
+                <a:effectLst/>
+                <a:latin typeface="Arial" panose="020B0604020202020204" pitchFamily="34" charset="0"/>
+              </a:rPr>
+              <a:t> board support:</a:t>
+            </a:r>
+          </a:p>
+          <a:p>
+            <a:pPr lvl="2"/>
+            <a:r>
+              <a:rPr lang="en-US" b="0" i="0" dirty="0">
+                <a:solidFill>
+                  <a:srgbClr val="222222"/>
+                </a:solidFill>
+                <a:effectLst/>
+                <a:latin typeface="Arial" panose="020B0604020202020204" pitchFamily="34" charset="0"/>
+              </a:rPr>
+              <a:t>From the Arduino File menu select Preferences.</a:t>
+            </a:r>
+          </a:p>
+          <a:p>
+            <a:pPr lvl="2"/>
+            <a:r>
+              <a:rPr lang="en-US" b="0" i="0" dirty="0">
+                <a:solidFill>
+                  <a:srgbClr val="222222"/>
+                </a:solidFill>
+                <a:effectLst/>
+                <a:latin typeface="Arial" panose="020B0604020202020204" pitchFamily="34" charset="0"/>
+              </a:rPr>
+              <a:t>Add the following URL to "Additional Board Manager URLs" section.</a:t>
+            </a:r>
+          </a:p>
+          <a:p>
+            <a:pPr lvl="2"/>
+            <a:r>
+              <a:rPr lang="en-US" b="0" i="0" dirty="0">
+                <a:solidFill>
+                  <a:srgbClr val="222222"/>
+                </a:solidFill>
+                <a:effectLst/>
+                <a:latin typeface="Arial" panose="020B0604020202020204" pitchFamily="34" charset="0"/>
+                <a:hlinkClick r:id="rId4"/>
+              </a:rPr>
+              <a:t>https://raw.githubusercontent.com/ultimachine/ArduinoAddons/master/package_ultimachine_index.json</a:t>
+            </a:r>
+            <a:endParaRPr lang="en-US" b="0" i="0" dirty="0">
+              <a:solidFill>
+                <a:srgbClr val="222222"/>
+              </a:solidFill>
+              <a:effectLst/>
+              <a:latin typeface="Arial" panose="020B0604020202020204" pitchFamily="34" charset="0"/>
+            </a:endParaRPr>
+          </a:p>
+          <a:p>
+            <a:pPr lvl="2"/>
+            <a:r>
+              <a:rPr lang="en-US" b="0" i="0" dirty="0">
+                <a:solidFill>
+                  <a:srgbClr val="222222"/>
+                </a:solidFill>
+                <a:effectLst/>
+                <a:latin typeface="Arial" panose="020B0604020202020204" pitchFamily="34" charset="0"/>
+              </a:rPr>
+              <a:t>The Board Manager is found at the top of the Tools-&gt;Board selection menu.</a:t>
+            </a:r>
+          </a:p>
+          <a:p>
+            <a:pPr lvl="2"/>
+            <a:r>
+              <a:rPr lang="en-US" b="0" i="0" dirty="0">
+                <a:solidFill>
+                  <a:srgbClr val="222222"/>
+                </a:solidFill>
+                <a:effectLst/>
+                <a:latin typeface="Arial" panose="020B0604020202020204" pitchFamily="34" charset="0"/>
+              </a:rPr>
+              <a:t>Open the Board Manager and the list boards will automatically update.</a:t>
+            </a:r>
+          </a:p>
+          <a:p>
+            <a:pPr lvl="2"/>
+            <a:r>
+              <a:rPr lang="en-US" b="0" i="0" dirty="0">
+                <a:solidFill>
+                  <a:srgbClr val="222222"/>
+                </a:solidFill>
+                <a:effectLst/>
+                <a:latin typeface="Arial" panose="020B0604020202020204" pitchFamily="34" charset="0"/>
+              </a:rPr>
+              <a:t>Search for </a:t>
+            </a:r>
+            <a:r>
+              <a:rPr lang="en-US" b="0" i="0" dirty="0" err="1">
+                <a:solidFill>
+                  <a:srgbClr val="222222"/>
+                </a:solidFill>
+                <a:effectLst/>
+                <a:latin typeface="Arial" panose="020B0604020202020204" pitchFamily="34" charset="0"/>
+              </a:rPr>
+              <a:t>Archim</a:t>
+            </a:r>
+            <a:r>
+              <a:rPr lang="en-US" b="0" i="0" dirty="0">
+                <a:solidFill>
+                  <a:srgbClr val="222222"/>
+                </a:solidFill>
+                <a:effectLst/>
+                <a:latin typeface="Arial" panose="020B0604020202020204" pitchFamily="34" charset="0"/>
+              </a:rPr>
+              <a:t> and install.</a:t>
+            </a:r>
+          </a:p>
+          <a:p>
+            <a:pPr marL="914400" lvl="1" indent="-457200">
+              <a:buFont typeface="+mj-lt"/>
+              <a:buAutoNum type="arabicPeriod"/>
+            </a:pPr>
+            <a:r>
+              <a:rPr lang="en-US" sz="2600" b="0" i="0" dirty="0">
+                <a:solidFill>
+                  <a:srgbClr val="222222"/>
+                </a:solidFill>
+                <a:effectLst/>
+                <a:latin typeface="Arial" panose="020B0604020202020204" pitchFamily="34" charset="0"/>
+              </a:rPr>
+              <a:t>Install </a:t>
+            </a:r>
+            <a:r>
+              <a:rPr lang="en-US" sz="2600" b="0" i="0" dirty="0" err="1">
+                <a:solidFill>
+                  <a:srgbClr val="222222"/>
+                </a:solidFill>
+                <a:effectLst/>
+                <a:latin typeface="Arial" panose="020B0604020202020204" pitchFamily="34" charset="0"/>
+              </a:rPr>
+              <a:t>TMCStepper</a:t>
+            </a:r>
+            <a:r>
+              <a:rPr lang="en-US" sz="2600" b="0" i="0" dirty="0">
+                <a:solidFill>
+                  <a:srgbClr val="222222"/>
+                </a:solidFill>
+                <a:effectLst/>
+                <a:latin typeface="Arial" panose="020B0604020202020204" pitchFamily="34" charset="0"/>
+              </a:rPr>
+              <a:t> library: Arduino IDE-&gt; Sketch menu -&gt; Include Library -&gt; Manage Libraries -&gt; install </a:t>
+            </a:r>
+            <a:r>
+              <a:rPr lang="en-US" sz="2600" b="0" i="0" dirty="0" err="1">
+                <a:solidFill>
+                  <a:srgbClr val="222222"/>
+                </a:solidFill>
+                <a:effectLst/>
+                <a:latin typeface="Arial" panose="020B0604020202020204" pitchFamily="34" charset="0"/>
+              </a:rPr>
+              <a:t>TMCStepper</a:t>
+            </a:r>
+            <a:endParaRPr lang="en-US" sz="2600" b="0" i="0" dirty="0">
+              <a:solidFill>
+                <a:srgbClr val="222222"/>
+              </a:solidFill>
+              <a:effectLst/>
+              <a:latin typeface="Arial" panose="020B0604020202020204" pitchFamily="34" charset="0"/>
+            </a:endParaRPr>
+          </a:p>
+          <a:p>
+            <a:pPr lvl="1"/>
+            <a:endParaRPr lang="en-US" dirty="0"/>
+          </a:p>
+        </p:txBody>
+      </p:sp>
+    </p:spTree>
+    <p:extLst>
+      <p:ext uri="{BB962C8B-B14F-4D97-AF65-F5344CB8AC3E}">
+        <p14:creationId xmlns:p14="http://schemas.microsoft.com/office/powerpoint/2010/main" val="3803564054"/>
+      </p:ext>
+    </p:extLst>
+  </p:cSld>
+  <p:clrMapOvr>
+    <a:masterClrMapping/>
+  </p:clrMapOvr>
+</p:sld>
+</file>
+
+<file path=ppt/slides/slide6.xml><?xml version="1.0" encoding="utf-8"?>
+<p:sld xmlns:a="http://schemas.openxmlformats.org/drawingml/2006/main" xmlns:r="http://schemas.openxmlformats.org/officeDocument/2006/relationships" xmlns:p="http://schemas.openxmlformats.org/presentationml/2006/main" show="0">
+  <p:cSld>
+    <p:spTree>
+      <p:nvGrpSpPr>
+        <p:cNvPr id="1" name=""/>
+        <p:cNvGrpSpPr/>
+        <p:nvPr/>
+      </p:nvGrpSpPr>
+      <p:grpSpPr>
+        <a:xfrm>
+          <a:off x="0" y="0"/>
+          <a:ext cx="0" cy="0"/>
+          <a:chOff x="0" y="0"/>
+          <a:chExt cx="0" cy="0"/>
+        </a:xfrm>
+      </p:grpSpPr>
+      <p:sp>
+        <p:nvSpPr>
+          <p:cNvPr id="2" name="Title 1">
+            <a:extLst>
+              <a:ext uri="{FF2B5EF4-FFF2-40B4-BE49-F238E27FC236}">
+                <a16:creationId xmlns:a16="http://schemas.microsoft.com/office/drawing/2014/main" id="{F9EF1949-871A-49E8-9C3B-0DB2DAB65832}"/>
+              </a:ext>
+            </a:extLst>
+          </p:cNvPr>
+          <p:cNvSpPr>
+            <a:spLocks noGrp="1"/>
+          </p:cNvSpPr>
+          <p:nvPr>
+            <p:ph type="title"/>
+          </p:nvPr>
+        </p:nvSpPr>
+        <p:spPr/>
+        <p:txBody>
+          <a:bodyPr/>
+          <a:lstStyle/>
+          <a:p>
+            <a:r>
+              <a:rPr lang="en-US" dirty="0"/>
+              <a:t>Modifying the code</a:t>
+            </a:r>
+            <a:br>
+              <a:rPr lang="en-US" dirty="0"/>
+            </a:br>
+            <a:r>
+              <a:rPr lang="en-US" dirty="0"/>
+              <a:t>Open Arduino IDE</a:t>
+            </a:r>
+          </a:p>
+        </p:txBody>
+      </p:sp>
+      <p:sp>
+        <p:nvSpPr>
+          <p:cNvPr id="3" name="Content Placeholder 2">
+            <a:extLst>
+              <a:ext uri="{FF2B5EF4-FFF2-40B4-BE49-F238E27FC236}">
+                <a16:creationId xmlns:a16="http://schemas.microsoft.com/office/drawing/2014/main" id="{A4C73B0B-0123-4494-BF0B-F50920C3F80C}"/>
+              </a:ext>
+            </a:extLst>
+          </p:cNvPr>
+          <p:cNvSpPr>
+            <a:spLocks noGrp="1"/>
+          </p:cNvSpPr>
+          <p:nvPr>
+            <p:ph idx="1"/>
+          </p:nvPr>
+        </p:nvSpPr>
+        <p:spPr>
+          <a:xfrm>
+            <a:off x="838200" y="1825625"/>
+            <a:ext cx="10515600" cy="4830814"/>
+          </a:xfrm>
+        </p:spPr>
+        <p:txBody>
+          <a:bodyPr>
+            <a:normAutofit/>
+          </a:bodyPr>
+          <a:lstStyle/>
+          <a:p>
+            <a:r>
+              <a:rPr lang="en-US" dirty="0"/>
+              <a:t>To prepare the code for modification, Open the “</a:t>
+            </a:r>
+            <a:r>
+              <a:rPr lang="en-US" dirty="0" err="1"/>
+              <a:t>Marlin.ino</a:t>
+            </a:r>
+            <a:r>
+              <a:rPr lang="en-US" dirty="0"/>
+              <a:t>” file in the Arduino IDE</a:t>
+            </a:r>
+          </a:p>
+          <a:p>
+            <a:r>
+              <a:rPr lang="en-US" dirty="0"/>
+              <a:t>Then select File-&gt;Preferences</a:t>
+            </a:r>
+          </a:p>
+          <a:p>
+            <a:r>
+              <a:rPr lang="en-US" dirty="0"/>
+              <a:t>In the options, select “Use External Editor”, and then confirm by selecting “OK”</a:t>
+            </a:r>
+          </a:p>
+          <a:p>
+            <a:r>
+              <a:rPr lang="en-US" dirty="0"/>
+              <a:t>Preparing the environment this way allows us to use the Arduino environment as an uploading environment while also allowing us to modify the same code that’s opened in Visual Studio Code</a:t>
+            </a:r>
+          </a:p>
+        </p:txBody>
+      </p:sp>
+    </p:spTree>
+    <p:extLst>
+      <p:ext uri="{BB962C8B-B14F-4D97-AF65-F5344CB8AC3E}">
+        <p14:creationId xmlns:p14="http://schemas.microsoft.com/office/powerpoint/2010/main" val="2503059429"/>
+      </p:ext>
+    </p:extLst>
+  </p:cSld>
+  <p:clrMapOvr>
+    <a:masterClrMapping/>
+  </p:clrMapOvr>
+</p:sld>
+</file>
+
+<file path=ppt/slides/slide7.xml><?xml version="1.0" encoding="utf-8"?>
+<p:sld xmlns:a="http://schemas.openxmlformats.org/drawingml/2006/main" xmlns:r="http://schemas.openxmlformats.org/officeDocument/2006/relationships" xmlns:p="http://schemas.openxmlformats.org/presentationml/2006/main" show="0">
+  <p:cSld>
+    <p:spTree>
+      <p:nvGrpSpPr>
+        <p:cNvPr id="1" name=""/>
+        <p:cNvGrpSpPr/>
+        <p:nvPr/>
+      </p:nvGrpSpPr>
+      <p:grpSpPr>
+        <a:xfrm>
+          <a:off x="0" y="0"/>
+          <a:ext cx="0" cy="0"/>
+          <a:chOff x="0" y="0"/>
+          <a:chExt cx="0" cy="0"/>
+        </a:xfrm>
+      </p:grpSpPr>
+      <p:sp>
+        <p:nvSpPr>
+          <p:cNvPr id="2" name="Title 1">
+            <a:extLst>
+              <a:ext uri="{FF2B5EF4-FFF2-40B4-BE49-F238E27FC236}">
+                <a16:creationId xmlns:a16="http://schemas.microsoft.com/office/drawing/2014/main" id="{F9EF1949-871A-49E8-9C3B-0DB2DAB65832}"/>
+              </a:ext>
+            </a:extLst>
+          </p:cNvPr>
+          <p:cNvSpPr>
+            <a:spLocks noGrp="1"/>
+          </p:cNvSpPr>
+          <p:nvPr>
+            <p:ph type="title"/>
+          </p:nvPr>
+        </p:nvSpPr>
+        <p:spPr/>
+        <p:txBody>
+          <a:bodyPr/>
+          <a:lstStyle/>
+          <a:p>
+            <a:r>
+              <a:rPr lang="en-US" dirty="0"/>
+              <a:t>Modifying the code</a:t>
+            </a:r>
+            <a:br>
+              <a:rPr lang="en-US" dirty="0"/>
+            </a:br>
+            <a:r>
+              <a:rPr lang="en-US" dirty="0"/>
+              <a:t>Open Visual Studio Code IDE</a:t>
+            </a:r>
+          </a:p>
+        </p:txBody>
+      </p:sp>
+      <p:sp>
+        <p:nvSpPr>
+          <p:cNvPr id="3" name="Content Placeholder 2">
+            <a:extLst>
+              <a:ext uri="{FF2B5EF4-FFF2-40B4-BE49-F238E27FC236}">
+                <a16:creationId xmlns:a16="http://schemas.microsoft.com/office/drawing/2014/main" id="{A4C73B0B-0123-4494-BF0B-F50920C3F80C}"/>
+              </a:ext>
+            </a:extLst>
+          </p:cNvPr>
+          <p:cNvSpPr>
+            <a:spLocks noGrp="1"/>
+          </p:cNvSpPr>
+          <p:nvPr>
+            <p:ph idx="1"/>
+          </p:nvPr>
+        </p:nvSpPr>
+        <p:spPr>
+          <a:xfrm>
+            <a:off x="838200" y="1825625"/>
+            <a:ext cx="10515600" cy="4830814"/>
+          </a:xfrm>
+        </p:spPr>
+        <p:txBody>
+          <a:bodyPr>
+            <a:normAutofit/>
+          </a:bodyPr>
+          <a:lstStyle/>
+          <a:p>
+            <a:r>
+              <a:rPr lang="en-US" dirty="0"/>
+              <a:t>Open Visual Studio Code IDE</a:t>
+            </a:r>
+          </a:p>
+          <a:p>
+            <a:r>
+              <a:rPr lang="en-US" dirty="0"/>
+              <a:t>Select “File” -&gt; “Open Folder”</a:t>
+            </a:r>
+          </a:p>
+          <a:p>
+            <a:r>
+              <a:rPr lang="en-US" dirty="0"/>
+              <a:t>Select the folder that has the code. If downloading the code from </a:t>
+            </a:r>
+            <a:r>
+              <a:rPr lang="en-US" dirty="0" err="1"/>
+              <a:t>Github</a:t>
+            </a:r>
+            <a:r>
+              <a:rPr lang="en-US" dirty="0"/>
+              <a:t>, this would be “exploratory-soft-printer”. Alternatively, you can open the “Marlin” subfolder underneath the “exploratory-soft-printer” folder.</a:t>
+            </a:r>
+          </a:p>
+          <a:p>
+            <a:r>
+              <a:rPr lang="en-US" dirty="0"/>
+              <a:t>You can now edit </a:t>
+            </a:r>
+            <a:r>
+              <a:rPr lang="en-US"/>
+              <a:t>the code.</a:t>
+            </a:r>
+            <a:endParaRPr lang="en-US" dirty="0"/>
+          </a:p>
+        </p:txBody>
+      </p:sp>
+    </p:spTree>
+    <p:extLst>
+      <p:ext uri="{BB962C8B-B14F-4D97-AF65-F5344CB8AC3E}">
+        <p14:creationId xmlns:p14="http://schemas.microsoft.com/office/powerpoint/2010/main" val="368636655"/>
+      </p:ext>
+    </p:extLst>
+  </p:cSld>
+  <p:clrMapOvr>
+    <a:masterClrMapping/>
+  </p:clrMapOvr>
+</p:sld>
+</file>
+
 <file path=ppt/slides/slide8.xml><?xml version="1.0" encoding="utf-8"?>
-<p:sld xmlns:a="http://schemas.openxmlformats.org/drawingml/2006/main" xmlns:r="http://schemas.openxmlformats.org/officeDocument/2006/relationships" xmlns:p="http://schemas.openxmlformats.org/presentationml/2006/main">
+<p:sld xmlns:a="http://schemas.openxmlformats.org/drawingml/2006/main" xmlns:r="http://schemas.openxmlformats.org/officeDocument/2006/relationships" xmlns:p="http://schemas.openxmlformats.org/presentationml/2006/main" show="0">
   <p:cSld>
     <p:spTree>
       <p:nvGrpSpPr>

</xml_diff>